<commit_message>
knitted the new report
</commit_message>
<xml_diff>
--- a/Case study1016.pptx
+++ b/Case study1016.pptx
@@ -15,9 +15,10 @@
     <p:sldId id="263" r:id="rId9"/>
     <p:sldId id="264" r:id="rId10"/>
     <p:sldId id="265" r:id="rId11"/>
-    <p:sldId id="268" r:id="rId12"/>
-    <p:sldId id="266" r:id="rId13"/>
-    <p:sldId id="267" r:id="rId14"/>
+    <p:sldId id="271" r:id="rId12"/>
+    <p:sldId id="268" r:id="rId13"/>
+    <p:sldId id="266" r:id="rId14"/>
+    <p:sldId id="267" r:id="rId15"/>
   </p:sldIdLst>
   <p:sldSz cx="12192000" cy="6858000"/>
   <p:notesSz cx="6858000" cy="9144000"/>
@@ -4070,13 +4071,8 @@
           <a:p>
             <a:r>
               <a:rPr lang="en-US" dirty="0"/>
-              <a:t>In depth analysis of Colorado is recommended for possible acquisitions </a:t>
+              <a:t>In depth analysis of Colorado is recommended for possible acquisitions and consolidation.</a:t>
             </a:r>
-            <a:r>
-              <a:rPr lang="en-US"/>
-              <a:t>and consolidation.</a:t>
-            </a:r>
-            <a:endParaRPr lang="en-US" dirty="0"/>
           </a:p>
           <a:p>
             <a:r>
@@ -4624,6 +4620,277 @@
       </p:grpSpPr>
       <p:sp>
         <p:nvSpPr>
+          <p:cNvPr id="2" name="Title 1">
+            <a:extLst>
+              <a:ext uri="{FF2B5EF4-FFF2-40B4-BE49-F238E27FC236}">
+                <a16:creationId xmlns:a16="http://schemas.microsoft.com/office/drawing/2014/main" id="{1FEB030F-C9C4-4CFE-B761-A190D2EC0DE8}"/>
+              </a:ext>
+            </a:extLst>
+          </p:cNvPr>
+          <p:cNvSpPr>
+            <a:spLocks noGrp="1"/>
+          </p:cNvSpPr>
+          <p:nvPr>
+            <p:ph type="title"/>
+          </p:nvPr>
+        </p:nvSpPr>
+        <p:spPr/>
+        <p:txBody>
+          <a:bodyPr/>
+          <a:lstStyle/>
+          <a:p>
+            <a:r>
+              <a:rPr lang="en-US" dirty="0"/>
+              <a:t>Summary</a:t>
+            </a:r>
+          </a:p>
+        </p:txBody>
+      </p:sp>
+      <p:sp>
+        <p:nvSpPr>
+          <p:cNvPr id="4" name="Content Placeholder 2">
+            <a:extLst>
+              <a:ext uri="{FF2B5EF4-FFF2-40B4-BE49-F238E27FC236}">
+                <a16:creationId xmlns:a16="http://schemas.microsoft.com/office/drawing/2014/main" id="{21469246-1468-4377-87B6-F56F73E0899C}"/>
+              </a:ext>
+            </a:extLst>
+          </p:cNvPr>
+          <p:cNvSpPr txBox="1">
+            <a:spLocks/>
+          </p:cNvSpPr>
+          <p:nvPr/>
+        </p:nvSpPr>
+        <p:spPr>
+          <a:xfrm>
+            <a:off x="507999" y="1719071"/>
+            <a:ext cx="11289260" cy="4407408"/>
+          </a:xfrm>
+          <a:prstGeom prst="rect">
+            <a:avLst/>
+          </a:prstGeom>
+        </p:spPr>
+        <p:txBody>
+          <a:bodyPr>
+            <a:normAutofit/>
+          </a:bodyPr>
+          <a:lstStyle>
+            <a:lvl1pPr marL="274320" indent="-228600" algn="l" defTabSz="914400" rtl="0" eaLnBrk="1" latinLnBrk="0" hangingPunct="1">
+              <a:spcBef>
+                <a:spcPct val="20000"/>
+              </a:spcBef>
+              <a:buClr>
+                <a:schemeClr val="accent1"/>
+              </a:buClr>
+              <a:buFont typeface="Wingdings 2" pitchFamily="18" charset="2"/>
+              <a:buChar char=""/>
+              <a:defRPr sz="2000" kern="1200" spc="150" baseline="0">
+                <a:solidFill>
+                  <a:schemeClr val="tx2"/>
+                </a:solidFill>
+                <a:latin typeface="+mn-lt"/>
+                <a:ea typeface="+mn-ea"/>
+                <a:cs typeface="+mn-cs"/>
+              </a:defRPr>
+            </a:lvl1pPr>
+            <a:lvl2pPr marL="548640" indent="-182880" algn="l" defTabSz="914400" rtl="0" eaLnBrk="1" latinLnBrk="0" hangingPunct="1">
+              <a:spcBef>
+                <a:spcPct val="20000"/>
+              </a:spcBef>
+              <a:buClr>
+                <a:schemeClr val="accent2"/>
+              </a:buClr>
+              <a:buFont typeface="Wingdings" pitchFamily="2" charset="2"/>
+              <a:buChar char="§"/>
+              <a:defRPr sz="1800" kern="1200" spc="100" baseline="0">
+                <a:solidFill>
+                  <a:schemeClr val="tx2"/>
+                </a:solidFill>
+                <a:latin typeface="+mn-lt"/>
+                <a:ea typeface="+mn-ea"/>
+                <a:cs typeface="+mn-cs"/>
+              </a:defRPr>
+            </a:lvl2pPr>
+            <a:lvl3pPr marL="822960" indent="-182880" algn="l" defTabSz="914400" rtl="0" eaLnBrk="1" latinLnBrk="0" hangingPunct="1">
+              <a:spcBef>
+                <a:spcPct val="20000"/>
+              </a:spcBef>
+              <a:buClr>
+                <a:schemeClr val="accent3"/>
+              </a:buClr>
+              <a:buFont typeface="Wingdings" pitchFamily="2" charset="2"/>
+              <a:buChar char="§"/>
+              <a:defRPr sz="1600" kern="1200" spc="100" baseline="0">
+                <a:solidFill>
+                  <a:schemeClr val="tx2"/>
+                </a:solidFill>
+                <a:latin typeface="+mn-lt"/>
+                <a:ea typeface="+mn-ea"/>
+                <a:cs typeface="+mn-cs"/>
+              </a:defRPr>
+            </a:lvl3pPr>
+            <a:lvl4pPr marL="1097280" indent="-182880" algn="l" defTabSz="914400" rtl="0" eaLnBrk="1" latinLnBrk="0" hangingPunct="1">
+              <a:spcBef>
+                <a:spcPct val="20000"/>
+              </a:spcBef>
+              <a:buClr>
+                <a:schemeClr val="accent4"/>
+              </a:buClr>
+              <a:buFont typeface="Wingdings" pitchFamily="2" charset="2"/>
+              <a:buChar char="§"/>
+              <a:defRPr sz="1400" kern="1200">
+                <a:solidFill>
+                  <a:schemeClr val="tx2"/>
+                </a:solidFill>
+                <a:latin typeface="+mn-lt"/>
+                <a:ea typeface="+mn-ea"/>
+                <a:cs typeface="+mn-cs"/>
+              </a:defRPr>
+            </a:lvl4pPr>
+            <a:lvl5pPr marL="1280160" indent="-182880" algn="l" defTabSz="914400" rtl="0" eaLnBrk="1" latinLnBrk="0" hangingPunct="1">
+              <a:spcBef>
+                <a:spcPct val="20000"/>
+              </a:spcBef>
+              <a:buClr>
+                <a:schemeClr val="accent6"/>
+              </a:buClr>
+              <a:buFont typeface="Wingdings" pitchFamily="2" charset="2"/>
+              <a:buChar char="§"/>
+              <a:defRPr sz="1300" kern="1200" spc="100" baseline="0">
+                <a:solidFill>
+                  <a:schemeClr val="tx2"/>
+                </a:solidFill>
+                <a:latin typeface="+mn-lt"/>
+                <a:ea typeface="+mn-ea"/>
+                <a:cs typeface="+mn-cs"/>
+              </a:defRPr>
+            </a:lvl5pPr>
+            <a:lvl6pPr marL="1554480" indent="-182880" algn="l" defTabSz="914400" rtl="0" eaLnBrk="1" latinLnBrk="0" hangingPunct="1">
+              <a:spcBef>
+                <a:spcPct val="20000"/>
+              </a:spcBef>
+              <a:buClr>
+                <a:schemeClr val="accent1"/>
+              </a:buClr>
+              <a:buFont typeface="Wingdings" pitchFamily="2" charset="2"/>
+              <a:buChar char="§"/>
+              <a:defRPr sz="1200" kern="1200">
+                <a:solidFill>
+                  <a:schemeClr val="tx2"/>
+                </a:solidFill>
+                <a:latin typeface="+mn-lt"/>
+                <a:ea typeface="+mn-ea"/>
+                <a:cs typeface="+mn-cs"/>
+              </a:defRPr>
+            </a:lvl6pPr>
+            <a:lvl7pPr marL="1828800" indent="-182880" algn="l" defTabSz="914400" rtl="0" eaLnBrk="1" latinLnBrk="0" hangingPunct="1">
+              <a:spcBef>
+                <a:spcPct val="20000"/>
+              </a:spcBef>
+              <a:buClr>
+                <a:schemeClr val="accent2"/>
+              </a:buClr>
+              <a:buFont typeface="Wingdings" pitchFamily="2" charset="2"/>
+              <a:buChar char="§"/>
+              <a:defRPr sz="1200" kern="1200">
+                <a:solidFill>
+                  <a:schemeClr val="tx2"/>
+                </a:solidFill>
+                <a:latin typeface="+mn-lt"/>
+                <a:ea typeface="+mn-ea"/>
+                <a:cs typeface="+mn-cs"/>
+              </a:defRPr>
+            </a:lvl7pPr>
+            <a:lvl8pPr marL="2103120" indent="-182880" algn="l" defTabSz="914400" rtl="0" eaLnBrk="1" latinLnBrk="0" hangingPunct="1">
+              <a:spcBef>
+                <a:spcPct val="20000"/>
+              </a:spcBef>
+              <a:buClr>
+                <a:schemeClr val="accent3"/>
+              </a:buClr>
+              <a:buFont typeface="Wingdings" pitchFamily="2" charset="2"/>
+              <a:buChar char="§"/>
+              <a:defRPr sz="1200" kern="1200">
+                <a:solidFill>
+                  <a:schemeClr val="tx2"/>
+                </a:solidFill>
+                <a:latin typeface="+mn-lt"/>
+                <a:ea typeface="+mn-ea"/>
+                <a:cs typeface="+mn-cs"/>
+              </a:defRPr>
+            </a:lvl8pPr>
+            <a:lvl9pPr marL="2377440" indent="-182880" algn="l" defTabSz="914400" rtl="0" eaLnBrk="1" latinLnBrk="0" hangingPunct="1">
+              <a:spcBef>
+                <a:spcPct val="20000"/>
+              </a:spcBef>
+              <a:buClr>
+                <a:schemeClr val="accent5"/>
+              </a:buClr>
+              <a:buFont typeface="Wingdings" pitchFamily="2" charset="2"/>
+              <a:buChar char="§"/>
+              <a:defRPr sz="1200" kern="1200">
+                <a:solidFill>
+                  <a:schemeClr val="tx2"/>
+                </a:solidFill>
+                <a:latin typeface="+mn-lt"/>
+                <a:ea typeface="+mn-ea"/>
+                <a:cs typeface="+mn-cs"/>
+              </a:defRPr>
+            </a:lvl9pPr>
+          </a:lstStyle>
+          <a:p>
+            <a:r>
+              <a:rPr lang="en-US" dirty="0"/>
+              <a:t>Alcohol Content and Bitterness showed a correlation, but the strength of that correlation was not examined in this analysis.</a:t>
+            </a:r>
+          </a:p>
+          <a:p>
+            <a:r>
+              <a:rPr lang="en-US" dirty="0"/>
+              <a:t>Further investigation is recommended for determining geographic significance or breweries and testing for </a:t>
+            </a:r>
+            <a:r>
+              <a:rPr lang="en-US"/>
+              <a:t>regional palates.</a:t>
+            </a:r>
+            <a:endParaRPr lang="en-US" dirty="0"/>
+          </a:p>
+          <a:p>
+            <a:endParaRPr lang="en-US" b="1" dirty="0"/>
+          </a:p>
+        </p:txBody>
+      </p:sp>
+    </p:spTree>
+    <p:extLst>
+      <p:ext uri="{BB962C8B-B14F-4D97-AF65-F5344CB8AC3E}">
+        <p14:creationId xmlns:p14="http://schemas.microsoft.com/office/powerpoint/2010/main" val="2738358167"/>
+      </p:ext>
+    </p:extLst>
+  </p:cSld>
+  <p:clrMapOvr>
+    <a:masterClrMapping/>
+  </p:clrMapOvr>
+</p:sld>
+</file>
+
+<file path=ppt/slides/slide12.xml><?xml version="1.0" encoding="utf-8"?>
+<p:sld xmlns:a="http://schemas.openxmlformats.org/drawingml/2006/main" xmlns:r="http://schemas.openxmlformats.org/officeDocument/2006/relationships" xmlns:p="http://schemas.openxmlformats.org/presentationml/2006/main">
+  <p:cSld>
+    <p:spTree>
+      <p:nvGrpSpPr>
+        <p:cNvPr id="1" name=""/>
+        <p:cNvGrpSpPr/>
+        <p:nvPr/>
+      </p:nvGrpSpPr>
+      <p:grpSpPr>
+        <a:xfrm>
+          <a:off x="0" y="0"/>
+          <a:ext cx="0" cy="0"/>
+          <a:chOff x="0" y="0"/>
+          <a:chExt cx="0" cy="0"/>
+        </a:xfrm>
+      </p:grpSpPr>
+      <p:sp>
+        <p:nvSpPr>
           <p:cNvPr id="2" name="Text Placeholder 1"/>
           <p:cNvSpPr>
             <a:spLocks noGrp="1"/>
@@ -4682,7 +4949,7 @@
 </p:sld>
 </file>
 
-<file path=ppt/slides/slide12.xml><?xml version="1.0" encoding="utf-8"?>
+<file path=ppt/slides/slide13.xml><?xml version="1.0" encoding="utf-8"?>
 <p:sld xmlns:a="http://schemas.openxmlformats.org/drawingml/2006/main" xmlns:r="http://schemas.openxmlformats.org/officeDocument/2006/relationships" xmlns:p="http://schemas.openxmlformats.org/presentationml/2006/main">
   <p:cSld>
     <p:spTree>
@@ -4800,7 +5067,7 @@
 </p:sld>
 </file>
 
-<file path=ppt/slides/slide13.xml><?xml version="1.0" encoding="utf-8"?>
+<file path=ppt/slides/slide14.xml><?xml version="1.0" encoding="utf-8"?>
 <p:sld xmlns:a="http://schemas.openxmlformats.org/drawingml/2006/main" xmlns:r="http://schemas.openxmlformats.org/officeDocument/2006/relationships" xmlns:p="http://schemas.openxmlformats.org/presentationml/2006/main">
   <p:cSld>
     <p:spTree>

</xml_diff>